<commit_message>
updating High Level Design
</commit_message>
<xml_diff>
--- a/HLD.pptx
+++ b/HLD.pptx
@@ -5,15 +5,17 @@
     <p:sldMasterId id="2147483648" r:id="rId1"/>
   </p:sldMasterIdLst>
   <p:notesMasterIdLst>
-    <p:notesMasterId r:id="rId8"/>
+    <p:notesMasterId r:id="rId10"/>
   </p:notesMasterIdLst>
   <p:sldIdLst>
     <p:sldId id="256" r:id="rId2"/>
     <p:sldId id="257" r:id="rId3"/>
     <p:sldId id="258" r:id="rId4"/>
     <p:sldId id="259" r:id="rId5"/>
-    <p:sldId id="260" r:id="rId6"/>
-    <p:sldId id="261" r:id="rId7"/>
+    <p:sldId id="263" r:id="rId6"/>
+    <p:sldId id="260" r:id="rId7"/>
+    <p:sldId id="262" r:id="rId8"/>
+    <p:sldId id="261" r:id="rId9"/>
   </p:sldIdLst>
   <p:sldSz cx="12192000" cy="6858000"/>
   <p:notesSz cx="6858000" cy="9144000"/>
@@ -202,7 +204,7 @@
           <a:p>
             <a:fld id="{062FBEEE-3D44-4EF6-9996-1AD5906BBFA0}" type="datetimeFigureOut">
               <a:rPr lang="en-US" smtClean="0"/>
-              <a:t>3/15/2021</a:t>
+              <a:t>3/17/2021</a:t>
             </a:fld>
             <a:endParaRPr lang="en-US"/>
           </a:p>
@@ -543,6 +545,90 @@
     </p:spTree>
     <p:extLst>
       <p:ext uri="{BB962C8B-B14F-4D97-AF65-F5344CB8AC3E}">
+        <p14:creationId xmlns:p14="http://schemas.microsoft.com/office/powerpoint/2010/main" val="1643559133"/>
+      </p:ext>
+    </p:extLst>
+  </p:cSld>
+  <p:clrMapOvr>
+    <a:masterClrMapping/>
+  </p:clrMapOvr>
+</p:notes>
+</file>
+
+<file path=ppt/notesSlides/notesSlide2.xml><?xml version="1.0" encoding="utf-8"?>
+<p:notes xmlns:a="http://schemas.openxmlformats.org/drawingml/2006/main" xmlns:r="http://schemas.openxmlformats.org/officeDocument/2006/relationships" xmlns:p="http://schemas.openxmlformats.org/presentationml/2006/main">
+  <p:cSld>
+    <p:spTree>
+      <p:nvGrpSpPr>
+        <p:cNvPr id="1" name=""/>
+        <p:cNvGrpSpPr/>
+        <p:nvPr/>
+      </p:nvGrpSpPr>
+      <p:grpSpPr>
+        <a:xfrm>
+          <a:off x="0" y="0"/>
+          <a:ext cx="0" cy="0"/>
+          <a:chOff x="0" y="0"/>
+          <a:chExt cx="0" cy="0"/>
+        </a:xfrm>
+      </p:grpSpPr>
+      <p:sp>
+        <p:nvSpPr>
+          <p:cNvPr id="2" name="Slide Image Placeholder 1"/>
+          <p:cNvSpPr>
+            <a:spLocks noGrp="1" noRot="1" noChangeAspect="1"/>
+          </p:cNvSpPr>
+          <p:nvPr>
+            <p:ph type="sldImg"/>
+          </p:nvPr>
+        </p:nvSpPr>
+        <p:spPr/>
+      </p:sp>
+      <p:sp>
+        <p:nvSpPr>
+          <p:cNvPr id="3" name="Notes Placeholder 2"/>
+          <p:cNvSpPr>
+            <a:spLocks noGrp="1"/>
+          </p:cNvSpPr>
+          <p:nvPr>
+            <p:ph type="body" idx="1"/>
+          </p:nvPr>
+        </p:nvSpPr>
+        <p:spPr/>
+        <p:txBody>
+          <a:bodyPr/>
+          <a:lstStyle/>
+          <a:p>
+            <a:endParaRPr lang="en-US" dirty="0"/>
+          </a:p>
+        </p:txBody>
+      </p:sp>
+      <p:sp>
+        <p:nvSpPr>
+          <p:cNvPr id="4" name="Slide Number Placeholder 3"/>
+          <p:cNvSpPr>
+            <a:spLocks noGrp="1"/>
+          </p:cNvSpPr>
+          <p:nvPr>
+            <p:ph type="sldNum" sz="quarter" idx="5"/>
+          </p:nvPr>
+        </p:nvSpPr>
+        <p:spPr/>
+        <p:txBody>
+          <a:bodyPr/>
+          <a:lstStyle/>
+          <a:p>
+            <a:fld id="{F79DC8A5-EC1B-4702-B6D1-FB5F4E89CBA3}" type="slidenum">
+              <a:rPr lang="en-US" smtClean="0"/>
+              <a:t>6</a:t>
+            </a:fld>
+            <a:endParaRPr lang="en-US"/>
+          </a:p>
+        </p:txBody>
+      </p:sp>
+    </p:spTree>
+    <p:extLst>
+      <p:ext uri="{BB962C8B-B14F-4D97-AF65-F5344CB8AC3E}">
         <p14:creationId xmlns:p14="http://schemas.microsoft.com/office/powerpoint/2010/main" val="617667070"/>
       </p:ext>
     </p:extLst>
@@ -700,7 +786,7 @@
           <a:p>
             <a:fld id="{92825DE1-AB31-412F-B3C0-4C7783632502}" type="datetimeFigureOut">
               <a:rPr lang="en-US" smtClean="0"/>
-              <a:t>3/14/2021</a:t>
+              <a:t>3/17/2021</a:t>
             </a:fld>
             <a:endParaRPr lang="en-US"/>
           </a:p>
@@ -898,7 +984,7 @@
           <a:p>
             <a:fld id="{92825DE1-AB31-412F-B3C0-4C7783632502}" type="datetimeFigureOut">
               <a:rPr lang="en-US" smtClean="0"/>
-              <a:t>3/14/2021</a:t>
+              <a:t>3/17/2021</a:t>
             </a:fld>
             <a:endParaRPr lang="en-US"/>
           </a:p>
@@ -1106,7 +1192,7 @@
           <a:p>
             <a:fld id="{92825DE1-AB31-412F-B3C0-4C7783632502}" type="datetimeFigureOut">
               <a:rPr lang="en-US" smtClean="0"/>
-              <a:t>3/14/2021</a:t>
+              <a:t>3/17/2021</a:t>
             </a:fld>
             <a:endParaRPr lang="en-US"/>
           </a:p>
@@ -1304,7 +1390,7 @@
           <a:p>
             <a:fld id="{92825DE1-AB31-412F-B3C0-4C7783632502}" type="datetimeFigureOut">
               <a:rPr lang="en-US" smtClean="0"/>
-              <a:t>3/14/2021</a:t>
+              <a:t>3/17/2021</a:t>
             </a:fld>
             <a:endParaRPr lang="en-US"/>
           </a:p>
@@ -1579,7 +1665,7 @@
           <a:p>
             <a:fld id="{92825DE1-AB31-412F-B3C0-4C7783632502}" type="datetimeFigureOut">
               <a:rPr lang="en-US" smtClean="0"/>
-              <a:t>3/14/2021</a:t>
+              <a:t>3/17/2021</a:t>
             </a:fld>
             <a:endParaRPr lang="en-US"/>
           </a:p>
@@ -1844,7 +1930,7 @@
           <a:p>
             <a:fld id="{92825DE1-AB31-412F-B3C0-4C7783632502}" type="datetimeFigureOut">
               <a:rPr lang="en-US" smtClean="0"/>
-              <a:t>3/14/2021</a:t>
+              <a:t>3/17/2021</a:t>
             </a:fld>
             <a:endParaRPr lang="en-US"/>
           </a:p>
@@ -2256,7 +2342,7 @@
           <a:p>
             <a:fld id="{92825DE1-AB31-412F-B3C0-4C7783632502}" type="datetimeFigureOut">
               <a:rPr lang="en-US" smtClean="0"/>
-              <a:t>3/14/2021</a:t>
+              <a:t>3/17/2021</a:t>
             </a:fld>
             <a:endParaRPr lang="en-US"/>
           </a:p>
@@ -2397,7 +2483,7 @@
           <a:p>
             <a:fld id="{92825DE1-AB31-412F-B3C0-4C7783632502}" type="datetimeFigureOut">
               <a:rPr lang="en-US" smtClean="0"/>
-              <a:t>3/14/2021</a:t>
+              <a:t>3/17/2021</a:t>
             </a:fld>
             <a:endParaRPr lang="en-US"/>
           </a:p>
@@ -2510,7 +2596,7 @@
           <a:p>
             <a:fld id="{92825DE1-AB31-412F-B3C0-4C7783632502}" type="datetimeFigureOut">
               <a:rPr lang="en-US" smtClean="0"/>
-              <a:t>3/14/2021</a:t>
+              <a:t>3/17/2021</a:t>
             </a:fld>
             <a:endParaRPr lang="en-US"/>
           </a:p>
@@ -2821,7 +2907,7 @@
           <a:p>
             <a:fld id="{92825DE1-AB31-412F-B3C0-4C7783632502}" type="datetimeFigureOut">
               <a:rPr lang="en-US" smtClean="0"/>
-              <a:t>3/14/2021</a:t>
+              <a:t>3/17/2021</a:t>
             </a:fld>
             <a:endParaRPr lang="en-US"/>
           </a:p>
@@ -3109,7 +3195,7 @@
           <a:p>
             <a:fld id="{92825DE1-AB31-412F-B3C0-4C7783632502}" type="datetimeFigureOut">
               <a:rPr lang="en-US" smtClean="0"/>
-              <a:t>3/14/2021</a:t>
+              <a:t>3/17/2021</a:t>
             </a:fld>
             <a:endParaRPr lang="en-US"/>
           </a:p>
@@ -3350,7 +3436,7 @@
           <a:p>
             <a:fld id="{92825DE1-AB31-412F-B3C0-4C7783632502}" type="datetimeFigureOut">
               <a:rPr lang="en-US" smtClean="0"/>
-              <a:t>3/14/2021</a:t>
+              <a:t>3/17/2021</a:t>
             </a:fld>
             <a:endParaRPr lang="en-US"/>
           </a:p>
@@ -5458,6 +5544,404 @@
 </file>
 
 <file path=ppt/slides/slide5.xml><?xml version="1.0" encoding="utf-8"?>
+<p:sld xmlns:a="http://schemas.openxmlformats.org/drawingml/2006/main" xmlns:r="http://schemas.openxmlformats.org/officeDocument/2006/relationships" xmlns:p="http://schemas.openxmlformats.org/presentationml/2006/main">
+  <p:cSld>
+    <p:spTree>
+      <p:nvGrpSpPr>
+        <p:cNvPr id="1" name=""/>
+        <p:cNvGrpSpPr/>
+        <p:nvPr/>
+      </p:nvGrpSpPr>
+      <p:grpSpPr>
+        <a:xfrm>
+          <a:off x="0" y="0"/>
+          <a:ext cx="0" cy="0"/>
+          <a:chOff x="0" y="0"/>
+          <a:chExt cx="0" cy="0"/>
+        </a:xfrm>
+      </p:grpSpPr>
+      <p:sp>
+        <p:nvSpPr>
+          <p:cNvPr id="2" name="Rectangle 1">
+            <a:extLst>
+              <a:ext uri="{FF2B5EF4-FFF2-40B4-BE49-F238E27FC236}">
+                <a16:creationId xmlns:a16="http://schemas.microsoft.com/office/drawing/2014/main" id="{43D6714F-76C6-4D61-931B-94CEE2DE814B}"/>
+              </a:ext>
+            </a:extLst>
+          </p:cNvPr>
+          <p:cNvSpPr/>
+          <p:nvPr/>
+        </p:nvSpPr>
+        <p:spPr>
+          <a:xfrm>
+            <a:off x="304630" y="509355"/>
+            <a:ext cx="11316748" cy="6166654"/>
+          </a:xfrm>
+          <a:prstGeom prst="rect">
+            <a:avLst/>
+          </a:prstGeom>
+          <a:solidFill>
+            <a:schemeClr val="tx1">
+              <a:lumMod val="65000"/>
+              <a:lumOff val="35000"/>
+            </a:schemeClr>
+          </a:solidFill>
+          <a:ln>
+            <a:solidFill>
+              <a:schemeClr val="tx1"/>
+            </a:solidFill>
+          </a:ln>
+        </p:spPr>
+        <p:style>
+          <a:lnRef idx="2">
+            <a:schemeClr val="accent1">
+              <a:shade val="50000"/>
+            </a:schemeClr>
+          </a:lnRef>
+          <a:fillRef idx="1">
+            <a:schemeClr val="accent1"/>
+          </a:fillRef>
+          <a:effectRef idx="0">
+            <a:schemeClr val="accent1"/>
+          </a:effectRef>
+          <a:fontRef idx="minor">
+            <a:schemeClr val="lt1"/>
+          </a:fontRef>
+        </p:style>
+        <p:txBody>
+          <a:bodyPr rtlCol="0" anchor="ctr"/>
+          <a:lstStyle/>
+          <a:p>
+            <a:pPr algn="ctr"/>
+            <a:endParaRPr lang="en-US"/>
+          </a:p>
+        </p:txBody>
+      </p:sp>
+      <p:sp>
+        <p:nvSpPr>
+          <p:cNvPr id="19" name="Rectangle 18">
+            <a:extLst>
+              <a:ext uri="{FF2B5EF4-FFF2-40B4-BE49-F238E27FC236}">
+                <a16:creationId xmlns:a16="http://schemas.microsoft.com/office/drawing/2014/main" id="{D77F9EAB-0D5E-4408-A917-EF8A3AA7C11A}"/>
+              </a:ext>
+            </a:extLst>
+          </p:cNvPr>
+          <p:cNvSpPr/>
+          <p:nvPr/>
+        </p:nvSpPr>
+        <p:spPr>
+          <a:xfrm>
+            <a:off x="304630" y="487887"/>
+            <a:ext cx="11316748" cy="1257864"/>
+          </a:xfrm>
+          <a:prstGeom prst="rect">
+            <a:avLst/>
+          </a:prstGeom>
+          <a:solidFill>
+            <a:srgbClr val="92D050"/>
+          </a:solidFill>
+          <a:ln>
+            <a:noFill/>
+          </a:ln>
+        </p:spPr>
+        <p:style>
+          <a:lnRef idx="2">
+            <a:schemeClr val="accent1">
+              <a:shade val="50000"/>
+            </a:schemeClr>
+          </a:lnRef>
+          <a:fillRef idx="1">
+            <a:schemeClr val="accent1"/>
+          </a:fillRef>
+          <a:effectRef idx="0">
+            <a:schemeClr val="accent1"/>
+          </a:effectRef>
+          <a:fontRef idx="minor">
+            <a:schemeClr val="lt1"/>
+          </a:fontRef>
+        </p:style>
+        <p:txBody>
+          <a:bodyPr rtlCol="0" anchor="ctr"/>
+          <a:lstStyle/>
+          <a:p>
+            <a:pPr algn="r"/>
+            <a:endParaRPr lang="en-US" dirty="0">
+              <a:solidFill>
+                <a:schemeClr val="tx1"/>
+              </a:solidFill>
+              <a:latin typeface="Goudy Stout" panose="0202090407030B020401" pitchFamily="18" charset="0"/>
+            </a:endParaRPr>
+          </a:p>
+        </p:txBody>
+      </p:sp>
+      <p:pic>
+        <p:nvPicPr>
+          <p:cNvPr id="8" name="Picture 7">
+            <a:extLst>
+              <a:ext uri="{FF2B5EF4-FFF2-40B4-BE49-F238E27FC236}">
+                <a16:creationId xmlns:a16="http://schemas.microsoft.com/office/drawing/2014/main" id="{5A765B47-C544-4EE1-87D2-C90C2A05E00A}"/>
+              </a:ext>
+            </a:extLst>
+          </p:cNvPr>
+          <p:cNvPicPr>
+            <a:picLocks noChangeAspect="1"/>
+          </p:cNvPicPr>
+          <p:nvPr/>
+        </p:nvPicPr>
+        <p:blipFill>
+          <a:blip r:embed="rId3"/>
+          <a:stretch>
+            <a:fillRect/>
+          </a:stretch>
+        </p:blipFill>
+        <p:spPr>
+          <a:xfrm>
+            <a:off x="10480472" y="616685"/>
+            <a:ext cx="914400" cy="934630"/>
+          </a:xfrm>
+          <a:prstGeom prst="ellipse">
+            <a:avLst/>
+          </a:prstGeom>
+          <a:ln>
+            <a:solidFill>
+              <a:schemeClr val="tx1"/>
+            </a:solidFill>
+          </a:ln>
+        </p:spPr>
+      </p:pic>
+      <p:sp>
+        <p:nvSpPr>
+          <p:cNvPr id="15" name="Rectangle 14">
+            <a:extLst>
+              <a:ext uri="{FF2B5EF4-FFF2-40B4-BE49-F238E27FC236}">
+                <a16:creationId xmlns:a16="http://schemas.microsoft.com/office/drawing/2014/main" id="{02CC4530-35BA-4B89-A466-D3BF9E1B7F32}"/>
+              </a:ext>
+            </a:extLst>
+          </p:cNvPr>
+          <p:cNvSpPr/>
+          <p:nvPr/>
+        </p:nvSpPr>
+        <p:spPr>
+          <a:xfrm>
+            <a:off x="656966" y="776077"/>
+            <a:ext cx="2910981" cy="654342"/>
+          </a:xfrm>
+          <a:prstGeom prst="rect">
+            <a:avLst/>
+          </a:prstGeom>
+          <a:solidFill>
+            <a:srgbClr val="92D050"/>
+          </a:solidFill>
+          <a:ln>
+            <a:noFill/>
+          </a:ln>
+        </p:spPr>
+        <p:style>
+          <a:lnRef idx="2">
+            <a:schemeClr val="accent1">
+              <a:shade val="50000"/>
+            </a:schemeClr>
+          </a:lnRef>
+          <a:fillRef idx="1">
+            <a:schemeClr val="accent1"/>
+          </a:fillRef>
+          <a:effectRef idx="0">
+            <a:schemeClr val="accent1"/>
+          </a:effectRef>
+          <a:fontRef idx="minor">
+            <a:schemeClr val="lt1"/>
+          </a:fontRef>
+        </p:style>
+        <p:txBody>
+          <a:bodyPr rtlCol="0" anchor="ctr"/>
+          <a:lstStyle/>
+          <a:p>
+            <a:pPr algn="r"/>
+            <a:r>
+              <a:rPr lang="en-US" dirty="0" err="1">
+                <a:solidFill>
+                  <a:schemeClr val="tx1"/>
+                </a:solidFill>
+                <a:latin typeface="Goudy Stout" panose="0202090407030B020401" pitchFamily="18" charset="0"/>
+              </a:rPr>
+              <a:t>FitStop</a:t>
+            </a:r>
+            <a:endParaRPr lang="en-US" dirty="0">
+              <a:solidFill>
+                <a:schemeClr val="tx1"/>
+              </a:solidFill>
+              <a:latin typeface="Goudy Stout" panose="0202090407030B020401" pitchFamily="18" charset="0"/>
+            </a:endParaRPr>
+          </a:p>
+        </p:txBody>
+      </p:sp>
+      <p:pic>
+        <p:nvPicPr>
+          <p:cNvPr id="14" name="Graphic 13" descr="Dumbbell">
+            <a:extLst>
+              <a:ext uri="{FF2B5EF4-FFF2-40B4-BE49-F238E27FC236}">
+                <a16:creationId xmlns:a16="http://schemas.microsoft.com/office/drawing/2014/main" id="{2C5ECF4D-F4DF-410F-91AF-1E83EF2C5AF7}"/>
+              </a:ext>
+            </a:extLst>
+          </p:cNvPr>
+          <p:cNvPicPr>
+            <a:picLocks noChangeAspect="1"/>
+          </p:cNvPicPr>
+          <p:nvPr/>
+        </p:nvPicPr>
+        <p:blipFill>
+          <a:blip r:embed="rId4">
+            <a:extLst>
+              <a:ext uri="{28A0092B-C50C-407E-A947-70E740481C1C}">
+                <a14:useLocalDpi xmlns:a14="http://schemas.microsoft.com/office/drawing/2010/main" val="0"/>
+              </a:ext>
+              <a:ext uri="{96DAC541-7B7A-43D3-8B79-37D633B846F1}">
+                <asvg:svgBlip xmlns:asvg="http://schemas.microsoft.com/office/drawing/2016/SVG/main" r:embed="rId5"/>
+              </a:ext>
+            </a:extLst>
+          </a:blip>
+          <a:stretch>
+            <a:fillRect/>
+          </a:stretch>
+        </p:blipFill>
+        <p:spPr>
+          <a:xfrm>
+            <a:off x="656966" y="638146"/>
+            <a:ext cx="914400" cy="914400"/>
+          </a:xfrm>
+          <a:prstGeom prst="rect">
+            <a:avLst/>
+          </a:prstGeom>
+        </p:spPr>
+      </p:pic>
+      <p:sp>
+        <p:nvSpPr>
+          <p:cNvPr id="20" name="TextBox 19">
+            <a:extLst>
+              <a:ext uri="{FF2B5EF4-FFF2-40B4-BE49-F238E27FC236}">
+                <a16:creationId xmlns:a16="http://schemas.microsoft.com/office/drawing/2014/main" id="{5243669D-1A6A-4946-8121-5B8B407E0611}"/>
+              </a:ext>
+            </a:extLst>
+          </p:cNvPr>
+          <p:cNvSpPr txBox="1"/>
+          <p:nvPr/>
+        </p:nvSpPr>
+        <p:spPr>
+          <a:xfrm>
+            <a:off x="4722921" y="-74564"/>
+            <a:ext cx="4995663" cy="630942"/>
+          </a:xfrm>
+          <a:prstGeom prst="rect">
+            <a:avLst/>
+          </a:prstGeom>
+          <a:noFill/>
+        </p:spPr>
+        <p:txBody>
+          <a:bodyPr wrap="none" rtlCol="0">
+            <a:spAutoFit/>
+          </a:bodyPr>
+          <a:lstStyle/>
+          <a:p>
+            <a:r>
+              <a:rPr lang="en-US" sz="3500" b="1"/>
+              <a:t>Management Page (Draft)</a:t>
+            </a:r>
+            <a:endParaRPr lang="en-US" sz="3500" b="1" dirty="0"/>
+          </a:p>
+        </p:txBody>
+      </p:sp>
+      <p:sp>
+        <p:nvSpPr>
+          <p:cNvPr id="3" name="Rectangle 2">
+            <a:extLst>
+              <a:ext uri="{FF2B5EF4-FFF2-40B4-BE49-F238E27FC236}">
+                <a16:creationId xmlns:a16="http://schemas.microsoft.com/office/drawing/2014/main" id="{DCDECCBE-2A41-4E91-8DC6-11324E2B396F}"/>
+              </a:ext>
+            </a:extLst>
+          </p:cNvPr>
+          <p:cNvSpPr/>
+          <p:nvPr/>
+        </p:nvSpPr>
+        <p:spPr>
+          <a:xfrm>
+            <a:off x="656966" y="2174840"/>
+            <a:ext cx="2726422" cy="1447249"/>
+          </a:xfrm>
+          <a:prstGeom prst="rect">
+            <a:avLst/>
+          </a:prstGeom>
+          <a:solidFill>
+            <a:srgbClr val="92D050"/>
+          </a:solidFill>
+          <a:ln>
+            <a:noFill/>
+          </a:ln>
+        </p:spPr>
+        <p:style>
+          <a:lnRef idx="2">
+            <a:schemeClr val="accent1">
+              <a:shade val="50000"/>
+            </a:schemeClr>
+          </a:lnRef>
+          <a:fillRef idx="1">
+            <a:schemeClr val="accent1"/>
+          </a:fillRef>
+          <a:effectRef idx="0">
+            <a:schemeClr val="accent1"/>
+          </a:effectRef>
+          <a:fontRef idx="minor">
+            <a:schemeClr val="lt1"/>
+          </a:fontRef>
+        </p:style>
+        <p:txBody>
+          <a:bodyPr rtlCol="0" anchor="ctr"/>
+          <a:lstStyle/>
+          <a:p>
+            <a:r>
+              <a:rPr lang="en-US" dirty="0">
+                <a:solidFill>
+                  <a:schemeClr val="tx1"/>
+                </a:solidFill>
+              </a:rPr>
+              <a:t>Admins</a:t>
+            </a:r>
+          </a:p>
+          <a:p>
+            <a:r>
+              <a:rPr lang="en-US" dirty="0">
+                <a:solidFill>
+                  <a:schemeClr val="tx1"/>
+                </a:solidFill>
+              </a:rPr>
+              <a:t>Trainers</a:t>
+            </a:r>
+          </a:p>
+          <a:p>
+            <a:r>
+              <a:rPr lang="en-US" dirty="0">
+                <a:solidFill>
+                  <a:schemeClr val="tx1"/>
+                </a:solidFill>
+              </a:rPr>
+              <a:t>Members</a:t>
+            </a:r>
+          </a:p>
+        </p:txBody>
+      </p:sp>
+    </p:spTree>
+    <p:extLst>
+      <p:ext uri="{BB962C8B-B14F-4D97-AF65-F5344CB8AC3E}">
+        <p14:creationId xmlns:p14="http://schemas.microsoft.com/office/powerpoint/2010/main" val="3546914448"/>
+      </p:ext>
+    </p:extLst>
+  </p:cSld>
+  <p:clrMapOvr>
+    <a:masterClrMapping/>
+  </p:clrMapOvr>
+</p:sld>
+</file>
+
+<file path=ppt/slides/slide6.xml><?xml version="1.0" encoding="utf-8"?>
 <p:sld xmlns:a="http://schemas.openxmlformats.org/drawingml/2006/main" xmlns:r="http://schemas.openxmlformats.org/officeDocument/2006/relationships" xmlns:p="http://schemas.openxmlformats.org/presentationml/2006/main">
   <p:cSld>
     <p:spTree>
@@ -7233,7 +7717,638 @@
 </p:sld>
 </file>
 
-<file path=ppt/slides/slide6.xml><?xml version="1.0" encoding="utf-8"?>
+<file path=ppt/slides/slide7.xml><?xml version="1.0" encoding="utf-8"?>
+<p:sld xmlns:a="http://schemas.openxmlformats.org/drawingml/2006/main" xmlns:r="http://schemas.openxmlformats.org/officeDocument/2006/relationships" xmlns:p="http://schemas.openxmlformats.org/presentationml/2006/main">
+  <p:cSld>
+    <p:spTree>
+      <p:nvGrpSpPr>
+        <p:cNvPr id="1" name=""/>
+        <p:cNvGrpSpPr/>
+        <p:nvPr/>
+      </p:nvGrpSpPr>
+      <p:grpSpPr>
+        <a:xfrm>
+          <a:off x="0" y="0"/>
+          <a:ext cx="0" cy="0"/>
+          <a:chOff x="0" y="0"/>
+          <a:chExt cx="0" cy="0"/>
+        </a:xfrm>
+      </p:grpSpPr>
+      <p:sp>
+        <p:nvSpPr>
+          <p:cNvPr id="3" name="Diamond 2">
+            <a:extLst>
+              <a:ext uri="{FF2B5EF4-FFF2-40B4-BE49-F238E27FC236}">
+                <a16:creationId xmlns:a16="http://schemas.microsoft.com/office/drawing/2014/main" id="{5186294C-9049-4172-8B93-31A17DA0A259}"/>
+              </a:ext>
+            </a:extLst>
+          </p:cNvPr>
+          <p:cNvSpPr/>
+          <p:nvPr/>
+        </p:nvSpPr>
+        <p:spPr>
+          <a:xfrm>
+            <a:off x="5343785" y="548078"/>
+            <a:ext cx="1828800" cy="1828800"/>
+          </a:xfrm>
+          <a:prstGeom prst="diamond">
+            <a:avLst/>
+          </a:prstGeom>
+          <a:solidFill>
+            <a:schemeClr val="bg1"/>
+          </a:solidFill>
+          <a:ln>
+            <a:solidFill>
+              <a:schemeClr val="tx1"/>
+            </a:solidFill>
+          </a:ln>
+        </p:spPr>
+        <p:style>
+          <a:lnRef idx="2">
+            <a:schemeClr val="accent1">
+              <a:shade val="50000"/>
+            </a:schemeClr>
+          </a:lnRef>
+          <a:fillRef idx="1">
+            <a:schemeClr val="accent1"/>
+          </a:fillRef>
+          <a:effectRef idx="0">
+            <a:schemeClr val="accent1"/>
+          </a:effectRef>
+          <a:fontRef idx="minor">
+            <a:schemeClr val="lt1"/>
+          </a:fontRef>
+        </p:style>
+        <p:txBody>
+          <a:bodyPr rtlCol="0" anchor="ctr"/>
+          <a:lstStyle/>
+          <a:p>
+            <a:pPr algn="ctr"/>
+            <a:r>
+              <a:rPr lang="en-US" sz="1200" dirty="0">
+                <a:solidFill>
+                  <a:schemeClr val="tx1"/>
+                </a:solidFill>
+              </a:rPr>
+              <a:t>Is</a:t>
+            </a:r>
+          </a:p>
+          <a:p>
+            <a:pPr algn="ctr"/>
+            <a:r>
+              <a:rPr lang="en-US" sz="1050" dirty="0">
+                <a:solidFill>
+                  <a:schemeClr val="tx1"/>
+                </a:solidFill>
+              </a:rPr>
+              <a:t>Management </a:t>
+            </a:r>
+          </a:p>
+          <a:p>
+            <a:pPr algn="ctr"/>
+            <a:r>
+              <a:rPr lang="en-US" sz="1200" dirty="0">
+                <a:solidFill>
+                  <a:schemeClr val="tx1"/>
+                </a:solidFill>
+              </a:rPr>
+              <a:t>Account?</a:t>
+            </a:r>
+          </a:p>
+        </p:txBody>
+      </p:sp>
+      <p:sp>
+        <p:nvSpPr>
+          <p:cNvPr id="11" name="Rectangle 10">
+            <a:extLst>
+              <a:ext uri="{FF2B5EF4-FFF2-40B4-BE49-F238E27FC236}">
+                <a16:creationId xmlns:a16="http://schemas.microsoft.com/office/drawing/2014/main" id="{D6DA4D4B-7C53-4F17-85CD-248EA3AB525F}"/>
+              </a:ext>
+            </a:extLst>
+          </p:cNvPr>
+          <p:cNvSpPr/>
+          <p:nvPr/>
+        </p:nvSpPr>
+        <p:spPr>
+          <a:xfrm>
+            <a:off x="864066" y="454259"/>
+            <a:ext cx="3657600" cy="640080"/>
+          </a:xfrm>
+          <a:prstGeom prst="rect">
+            <a:avLst/>
+          </a:prstGeom>
+          <a:solidFill>
+            <a:schemeClr val="bg1"/>
+          </a:solidFill>
+          <a:ln>
+            <a:solidFill>
+              <a:schemeClr val="tx1"/>
+            </a:solidFill>
+          </a:ln>
+        </p:spPr>
+        <p:style>
+          <a:lnRef idx="2">
+            <a:schemeClr val="accent1">
+              <a:shade val="50000"/>
+            </a:schemeClr>
+          </a:lnRef>
+          <a:fillRef idx="1">
+            <a:schemeClr val="accent1"/>
+          </a:fillRef>
+          <a:effectRef idx="0">
+            <a:schemeClr val="accent1"/>
+          </a:effectRef>
+          <a:fontRef idx="minor">
+            <a:schemeClr val="lt1"/>
+          </a:fontRef>
+        </p:style>
+        <p:txBody>
+          <a:bodyPr rtlCol="0" anchor="ctr"/>
+          <a:lstStyle/>
+          <a:p>
+            <a:pPr algn="ctr"/>
+            <a:r>
+              <a:rPr lang="en-US" dirty="0">
+                <a:solidFill>
+                  <a:schemeClr val="tx1"/>
+                </a:solidFill>
+              </a:rPr>
+              <a:t>Trainer Page</a:t>
+            </a:r>
+          </a:p>
+        </p:txBody>
+      </p:sp>
+      <p:cxnSp>
+        <p:nvCxnSpPr>
+          <p:cNvPr id="17" name="Straight Arrow Connector 16">
+            <a:extLst>
+              <a:ext uri="{FF2B5EF4-FFF2-40B4-BE49-F238E27FC236}">
+                <a16:creationId xmlns:a16="http://schemas.microsoft.com/office/drawing/2014/main" id="{F5146C2C-B6AC-4A01-87D1-B0B63F0A3E93}"/>
+              </a:ext>
+            </a:extLst>
+          </p:cNvPr>
+          <p:cNvCxnSpPr>
+            <a:cxnSpLocks/>
+            <a:stCxn id="11" idx="2"/>
+            <a:endCxn id="23" idx="0"/>
+          </p:cNvCxnSpPr>
+          <p:nvPr/>
+        </p:nvCxnSpPr>
+        <p:spPr>
+          <a:xfrm>
+            <a:off x="2692866" y="1094339"/>
+            <a:ext cx="0" cy="467409"/>
+          </a:xfrm>
+          <a:prstGeom prst="straightConnector1">
+            <a:avLst/>
+          </a:prstGeom>
+          <a:ln>
+            <a:tailEnd type="triangle"/>
+          </a:ln>
+        </p:spPr>
+        <p:style>
+          <a:lnRef idx="1">
+            <a:schemeClr val="dk1"/>
+          </a:lnRef>
+          <a:fillRef idx="0">
+            <a:schemeClr val="dk1"/>
+          </a:fillRef>
+          <a:effectRef idx="0">
+            <a:schemeClr val="dk1"/>
+          </a:effectRef>
+          <a:fontRef idx="minor">
+            <a:schemeClr val="tx1"/>
+          </a:fontRef>
+        </p:style>
+      </p:cxnSp>
+      <p:grpSp>
+        <p:nvGrpSpPr>
+          <p:cNvPr id="47" name="Group 46">
+            <a:extLst>
+              <a:ext uri="{FF2B5EF4-FFF2-40B4-BE49-F238E27FC236}">
+                <a16:creationId xmlns:a16="http://schemas.microsoft.com/office/drawing/2014/main" id="{CBDF6F02-5089-4D76-8DAF-11D8AE481E66}"/>
+              </a:ext>
+            </a:extLst>
+          </p:cNvPr>
+          <p:cNvGrpSpPr/>
+          <p:nvPr/>
+        </p:nvGrpSpPr>
+        <p:grpSpPr>
+          <a:xfrm>
+            <a:off x="3650612" y="4824128"/>
+            <a:ext cx="1371600" cy="1371600"/>
+            <a:chOff x="3650612" y="4824128"/>
+            <a:chExt cx="1371600" cy="1371600"/>
+          </a:xfrm>
+        </p:grpSpPr>
+        <p:sp>
+          <p:nvSpPr>
+            <p:cNvPr id="43" name="TextBox 42">
+              <a:extLst>
+                <a:ext uri="{FF2B5EF4-FFF2-40B4-BE49-F238E27FC236}">
+                  <a16:creationId xmlns:a16="http://schemas.microsoft.com/office/drawing/2014/main" id="{1B2E5F94-4C43-45B6-A543-8457E5E7DDF9}"/>
+                </a:ext>
+              </a:extLst>
+            </p:cNvPr>
+            <p:cNvSpPr txBox="1"/>
+            <p:nvPr/>
+          </p:nvSpPr>
+          <p:spPr>
+            <a:xfrm>
+              <a:off x="3650612" y="4824128"/>
+              <a:ext cx="1371600" cy="1371600"/>
+            </a:xfrm>
+            <a:prstGeom prst="rect">
+              <a:avLst/>
+            </a:prstGeom>
+            <a:solidFill>
+              <a:schemeClr val="bg2"/>
+            </a:solidFill>
+          </p:spPr>
+          <p:txBody>
+            <a:bodyPr wrap="square" rtlCol="0" anchor="ctr">
+              <a:spAutoFit/>
+            </a:bodyPr>
+            <a:lstStyle/>
+            <a:p>
+              <a:pPr>
+                <a:lnSpc>
+                  <a:spcPct val="200000"/>
+                </a:lnSpc>
+              </a:pPr>
+              <a:r>
+                <a:rPr lang="en-US" sz="1200" dirty="0"/>
+                <a:t>Flow</a:t>
+              </a:r>
+            </a:p>
+            <a:p>
+              <a:pPr>
+                <a:lnSpc>
+                  <a:spcPct val="200000"/>
+                </a:lnSpc>
+              </a:pPr>
+              <a:r>
+                <a:rPr lang="en-US" sz="1200" dirty="0"/>
+                <a:t>Yes Flow</a:t>
+              </a:r>
+            </a:p>
+            <a:p>
+              <a:pPr>
+                <a:lnSpc>
+                  <a:spcPct val="200000"/>
+                </a:lnSpc>
+              </a:pPr>
+              <a:r>
+                <a:rPr lang="en-US" sz="1200" dirty="0"/>
+                <a:t>No Flow</a:t>
+              </a:r>
+            </a:p>
+          </p:txBody>
+        </p:sp>
+        <p:cxnSp>
+          <p:nvCxnSpPr>
+            <p:cNvPr id="40" name="Straight Arrow Connector 39">
+              <a:extLst>
+                <a:ext uri="{FF2B5EF4-FFF2-40B4-BE49-F238E27FC236}">
+                  <a16:creationId xmlns:a16="http://schemas.microsoft.com/office/drawing/2014/main" id="{AF3B6067-253B-4360-A028-A96DC493EF76}"/>
+                </a:ext>
+              </a:extLst>
+            </p:cNvPr>
+            <p:cNvCxnSpPr/>
+            <p:nvPr/>
+          </p:nvCxnSpPr>
+          <p:spPr>
+            <a:xfrm>
+              <a:off x="3748486" y="5323045"/>
+              <a:ext cx="914400" cy="0"/>
+            </a:xfrm>
+            <a:prstGeom prst="straightConnector1">
+              <a:avLst/>
+            </a:prstGeom>
+            <a:solidFill>
+              <a:schemeClr val="bg1"/>
+            </a:solidFill>
+            <a:ln>
+              <a:tailEnd type="triangle"/>
+            </a:ln>
+          </p:spPr>
+          <p:style>
+            <a:lnRef idx="1">
+              <a:schemeClr val="dk1"/>
+            </a:lnRef>
+            <a:fillRef idx="0">
+              <a:schemeClr val="dk1"/>
+            </a:fillRef>
+            <a:effectRef idx="0">
+              <a:schemeClr val="dk1"/>
+            </a:effectRef>
+            <a:fontRef idx="minor">
+              <a:schemeClr val="tx1"/>
+            </a:fontRef>
+          </p:style>
+        </p:cxnSp>
+        <p:cxnSp>
+          <p:nvCxnSpPr>
+            <p:cNvPr id="41" name="Straight Arrow Connector 40">
+              <a:extLst>
+                <a:ext uri="{FF2B5EF4-FFF2-40B4-BE49-F238E27FC236}">
+                  <a16:creationId xmlns:a16="http://schemas.microsoft.com/office/drawing/2014/main" id="{BF16423B-DAD5-4814-B03A-7C778673435E}"/>
+                </a:ext>
+              </a:extLst>
+            </p:cNvPr>
+            <p:cNvCxnSpPr/>
+            <p:nvPr/>
+          </p:nvCxnSpPr>
+          <p:spPr>
+            <a:xfrm>
+              <a:off x="3755479" y="5671466"/>
+              <a:ext cx="914400" cy="0"/>
+            </a:xfrm>
+            <a:prstGeom prst="straightConnector1">
+              <a:avLst/>
+            </a:prstGeom>
+            <a:solidFill>
+              <a:schemeClr val="bg1"/>
+            </a:solidFill>
+            <a:ln>
+              <a:tailEnd type="triangle"/>
+            </a:ln>
+          </p:spPr>
+          <p:style>
+            <a:lnRef idx="1">
+              <a:schemeClr val="accent6"/>
+            </a:lnRef>
+            <a:fillRef idx="0">
+              <a:schemeClr val="accent6"/>
+            </a:fillRef>
+            <a:effectRef idx="0">
+              <a:schemeClr val="accent6"/>
+            </a:effectRef>
+            <a:fontRef idx="minor">
+              <a:schemeClr val="tx1"/>
+            </a:fontRef>
+          </p:style>
+        </p:cxnSp>
+        <p:cxnSp>
+          <p:nvCxnSpPr>
+            <p:cNvPr id="42" name="Straight Arrow Connector 41">
+              <a:extLst>
+                <a:ext uri="{FF2B5EF4-FFF2-40B4-BE49-F238E27FC236}">
+                  <a16:creationId xmlns:a16="http://schemas.microsoft.com/office/drawing/2014/main" id="{5E08244F-EC87-49CA-AC64-0A0E51716C51}"/>
+                </a:ext>
+              </a:extLst>
+            </p:cNvPr>
+            <p:cNvCxnSpPr/>
+            <p:nvPr/>
+          </p:nvCxnSpPr>
+          <p:spPr>
+            <a:xfrm>
+              <a:off x="3755479" y="6066869"/>
+              <a:ext cx="914400" cy="0"/>
+            </a:xfrm>
+            <a:prstGeom prst="straightConnector1">
+              <a:avLst/>
+            </a:prstGeom>
+            <a:solidFill>
+              <a:schemeClr val="bg1"/>
+            </a:solidFill>
+            <a:ln>
+              <a:solidFill>
+                <a:srgbClr val="FF0000"/>
+              </a:solidFill>
+              <a:tailEnd type="triangle"/>
+            </a:ln>
+          </p:spPr>
+          <p:style>
+            <a:lnRef idx="1">
+              <a:schemeClr val="dk1"/>
+            </a:lnRef>
+            <a:fillRef idx="0">
+              <a:schemeClr val="dk1"/>
+            </a:fillRef>
+            <a:effectRef idx="0">
+              <a:schemeClr val="dk1"/>
+            </a:effectRef>
+            <a:fontRef idx="minor">
+              <a:schemeClr val="tx1"/>
+            </a:fontRef>
+          </p:style>
+        </p:cxnSp>
+      </p:grpSp>
+      <p:sp>
+        <p:nvSpPr>
+          <p:cNvPr id="26" name="TextBox 25">
+            <a:extLst>
+              <a:ext uri="{FF2B5EF4-FFF2-40B4-BE49-F238E27FC236}">
+                <a16:creationId xmlns:a16="http://schemas.microsoft.com/office/drawing/2014/main" id="{DE931DAA-C55E-427C-891A-2118214E416B}"/>
+              </a:ext>
+            </a:extLst>
+          </p:cNvPr>
+          <p:cNvSpPr txBox="1"/>
+          <p:nvPr/>
+        </p:nvSpPr>
+        <p:spPr>
+          <a:xfrm>
+            <a:off x="4722921" y="-74564"/>
+            <a:ext cx="4805739" cy="630942"/>
+          </a:xfrm>
+          <a:prstGeom prst="rect">
+            <a:avLst/>
+          </a:prstGeom>
+          <a:noFill/>
+        </p:spPr>
+        <p:txBody>
+          <a:bodyPr wrap="none" rtlCol="0">
+            <a:spAutoFit/>
+          </a:bodyPr>
+          <a:lstStyle/>
+          <a:p>
+            <a:r>
+              <a:rPr lang="en-US" sz="3500" b="1" dirty="0"/>
+              <a:t>Trainer Page Flow (Draft)</a:t>
+            </a:r>
+          </a:p>
+        </p:txBody>
+      </p:sp>
+      <p:sp>
+        <p:nvSpPr>
+          <p:cNvPr id="23" name="Rectangle 22">
+            <a:extLst>
+              <a:ext uri="{FF2B5EF4-FFF2-40B4-BE49-F238E27FC236}">
+                <a16:creationId xmlns:a16="http://schemas.microsoft.com/office/drawing/2014/main" id="{32F34699-D286-465D-B23E-1F6452D8ECD0}"/>
+              </a:ext>
+            </a:extLst>
+          </p:cNvPr>
+          <p:cNvSpPr/>
+          <p:nvPr/>
+        </p:nvSpPr>
+        <p:spPr>
+          <a:xfrm>
+            <a:off x="864066" y="1561748"/>
+            <a:ext cx="3657600" cy="640080"/>
+          </a:xfrm>
+          <a:prstGeom prst="rect">
+            <a:avLst/>
+          </a:prstGeom>
+          <a:solidFill>
+            <a:schemeClr val="bg1"/>
+          </a:solidFill>
+          <a:ln>
+            <a:solidFill>
+              <a:schemeClr val="tx1"/>
+            </a:solidFill>
+          </a:ln>
+        </p:spPr>
+        <p:style>
+          <a:lnRef idx="2">
+            <a:schemeClr val="accent1">
+              <a:shade val="50000"/>
+            </a:schemeClr>
+          </a:lnRef>
+          <a:fillRef idx="1">
+            <a:schemeClr val="accent1"/>
+          </a:fillRef>
+          <a:effectRef idx="0">
+            <a:schemeClr val="accent1"/>
+          </a:effectRef>
+          <a:fontRef idx="minor">
+            <a:schemeClr val="lt1"/>
+          </a:fontRef>
+        </p:style>
+        <p:txBody>
+          <a:bodyPr rtlCol="0" anchor="ctr"/>
+          <a:lstStyle/>
+          <a:p>
+            <a:pPr algn="ctr"/>
+            <a:r>
+              <a:rPr lang="en-US" dirty="0">
+                <a:solidFill>
+                  <a:schemeClr val="tx1"/>
+                </a:solidFill>
+              </a:rPr>
+              <a:t>Get members associated with that trainer</a:t>
+            </a:r>
+          </a:p>
+        </p:txBody>
+      </p:sp>
+      <p:sp>
+        <p:nvSpPr>
+          <p:cNvPr id="25" name="Rectangle 24">
+            <a:extLst>
+              <a:ext uri="{FF2B5EF4-FFF2-40B4-BE49-F238E27FC236}">
+                <a16:creationId xmlns:a16="http://schemas.microsoft.com/office/drawing/2014/main" id="{897F9C57-C11C-45E4-8D11-E4A884A52021}"/>
+              </a:ext>
+            </a:extLst>
+          </p:cNvPr>
+          <p:cNvSpPr/>
+          <p:nvPr/>
+        </p:nvSpPr>
+        <p:spPr>
+          <a:xfrm>
+            <a:off x="864066" y="2669237"/>
+            <a:ext cx="3657600" cy="640080"/>
+          </a:xfrm>
+          <a:prstGeom prst="rect">
+            <a:avLst/>
+          </a:prstGeom>
+          <a:solidFill>
+            <a:schemeClr val="bg1"/>
+          </a:solidFill>
+          <a:ln>
+            <a:solidFill>
+              <a:schemeClr val="tx1"/>
+            </a:solidFill>
+          </a:ln>
+        </p:spPr>
+        <p:style>
+          <a:lnRef idx="2">
+            <a:schemeClr val="accent1">
+              <a:shade val="50000"/>
+            </a:schemeClr>
+          </a:lnRef>
+          <a:fillRef idx="1">
+            <a:schemeClr val="accent1"/>
+          </a:fillRef>
+          <a:effectRef idx="0">
+            <a:schemeClr val="accent1"/>
+          </a:effectRef>
+          <a:fontRef idx="minor">
+            <a:schemeClr val="lt1"/>
+          </a:fontRef>
+        </p:style>
+        <p:txBody>
+          <a:bodyPr rtlCol="0" anchor="ctr"/>
+          <a:lstStyle/>
+          <a:p>
+            <a:pPr algn="ctr"/>
+            <a:r>
+              <a:rPr lang="en-US" dirty="0">
+                <a:solidFill>
+                  <a:schemeClr val="tx1"/>
+                </a:solidFill>
+              </a:rPr>
+              <a:t>Put the associated members to the table</a:t>
+            </a:r>
+          </a:p>
+        </p:txBody>
+      </p:sp>
+      <p:cxnSp>
+        <p:nvCxnSpPr>
+          <p:cNvPr id="29" name="Straight Arrow Connector 28">
+            <a:extLst>
+              <a:ext uri="{FF2B5EF4-FFF2-40B4-BE49-F238E27FC236}">
+                <a16:creationId xmlns:a16="http://schemas.microsoft.com/office/drawing/2014/main" id="{0CC7D7A9-AED8-4979-9596-ED0D1922B4B5}"/>
+              </a:ext>
+            </a:extLst>
+          </p:cNvPr>
+          <p:cNvCxnSpPr>
+            <a:cxnSpLocks/>
+            <a:stCxn id="23" idx="2"/>
+            <a:endCxn id="25" idx="0"/>
+          </p:cNvCxnSpPr>
+          <p:nvPr/>
+        </p:nvCxnSpPr>
+        <p:spPr>
+          <a:xfrm>
+            <a:off x="2692866" y="2201828"/>
+            <a:ext cx="0" cy="467409"/>
+          </a:xfrm>
+          <a:prstGeom prst="straightConnector1">
+            <a:avLst/>
+          </a:prstGeom>
+          <a:ln>
+            <a:tailEnd type="triangle"/>
+          </a:ln>
+        </p:spPr>
+        <p:style>
+          <a:lnRef idx="1">
+            <a:schemeClr val="dk1"/>
+          </a:lnRef>
+          <a:fillRef idx="0">
+            <a:schemeClr val="dk1"/>
+          </a:fillRef>
+          <a:effectRef idx="0">
+            <a:schemeClr val="dk1"/>
+          </a:effectRef>
+          <a:fontRef idx="minor">
+            <a:schemeClr val="tx1"/>
+          </a:fontRef>
+        </p:style>
+      </p:cxnSp>
+    </p:spTree>
+    <p:extLst>
+      <p:ext uri="{BB962C8B-B14F-4D97-AF65-F5344CB8AC3E}">
+        <p14:creationId xmlns:p14="http://schemas.microsoft.com/office/powerpoint/2010/main" val="246659253"/>
+      </p:ext>
+    </p:extLst>
+  </p:cSld>
+  <p:clrMapOvr>
+    <a:masterClrMapping/>
+  </p:clrMapOvr>
+</p:sld>
+</file>
+
+<file path=ppt/slides/slide8.xml><?xml version="1.0" encoding="utf-8"?>
 <p:sld xmlns:a="http://schemas.openxmlformats.org/drawingml/2006/main" xmlns:r="http://schemas.openxmlformats.org/officeDocument/2006/relationships" xmlns:p="http://schemas.openxmlformats.org/presentationml/2006/main">
   <p:cSld>
     <p:spTree>

</xml_diff>